<commit_message>
Add ER Diagram to webpage
</commit_message>
<xml_diff>
--- a/diagrams/Data flow.pptx
+++ b/diagrams/Data flow.pptx
@@ -252,7 +252,7 @@
           <a:p>
             <a:fld id="{846CE7D5-CF57-46EF-B807-FDD0502418D4}" type="datetimeFigureOut">
               <a:rPr lang="en-GB" smtClean="0"/>
-              <a:t>20/08/2021</a:t>
+              <a:t>27/08/2021</a:t>
             </a:fld>
             <a:endParaRPr lang="en-GB"/>
           </a:p>
@@ -422,7 +422,7 @@
           <a:p>
             <a:fld id="{846CE7D5-CF57-46EF-B807-FDD0502418D4}" type="datetimeFigureOut">
               <a:rPr lang="en-GB" smtClean="0"/>
-              <a:t>20/08/2021</a:t>
+              <a:t>27/08/2021</a:t>
             </a:fld>
             <a:endParaRPr lang="en-GB"/>
           </a:p>
@@ -602,7 +602,7 @@
           <a:p>
             <a:fld id="{846CE7D5-CF57-46EF-B807-FDD0502418D4}" type="datetimeFigureOut">
               <a:rPr lang="en-GB" smtClean="0"/>
-              <a:t>20/08/2021</a:t>
+              <a:t>27/08/2021</a:t>
             </a:fld>
             <a:endParaRPr lang="en-GB"/>
           </a:p>
@@ -772,7 +772,7 @@
           <a:p>
             <a:fld id="{846CE7D5-CF57-46EF-B807-FDD0502418D4}" type="datetimeFigureOut">
               <a:rPr lang="en-GB" smtClean="0"/>
-              <a:t>20/08/2021</a:t>
+              <a:t>27/08/2021</a:t>
             </a:fld>
             <a:endParaRPr lang="en-GB"/>
           </a:p>
@@ -1018,7 +1018,7 @@
           <a:p>
             <a:fld id="{846CE7D5-CF57-46EF-B807-FDD0502418D4}" type="datetimeFigureOut">
               <a:rPr lang="en-GB" smtClean="0"/>
-              <a:t>20/08/2021</a:t>
+              <a:t>27/08/2021</a:t>
             </a:fld>
             <a:endParaRPr lang="en-GB"/>
           </a:p>
@@ -1250,7 +1250,7 @@
           <a:p>
             <a:fld id="{846CE7D5-CF57-46EF-B807-FDD0502418D4}" type="datetimeFigureOut">
               <a:rPr lang="en-GB" smtClean="0"/>
-              <a:t>20/08/2021</a:t>
+              <a:t>27/08/2021</a:t>
             </a:fld>
             <a:endParaRPr lang="en-GB"/>
           </a:p>
@@ -1617,7 +1617,7 @@
           <a:p>
             <a:fld id="{846CE7D5-CF57-46EF-B807-FDD0502418D4}" type="datetimeFigureOut">
               <a:rPr lang="en-GB" smtClean="0"/>
-              <a:t>20/08/2021</a:t>
+              <a:t>27/08/2021</a:t>
             </a:fld>
             <a:endParaRPr lang="en-GB"/>
           </a:p>
@@ -1735,7 +1735,7 @@
           <a:p>
             <a:fld id="{846CE7D5-CF57-46EF-B807-FDD0502418D4}" type="datetimeFigureOut">
               <a:rPr lang="en-GB" smtClean="0"/>
-              <a:t>20/08/2021</a:t>
+              <a:t>27/08/2021</a:t>
             </a:fld>
             <a:endParaRPr lang="en-GB"/>
           </a:p>
@@ -1830,7 +1830,7 @@
           <a:p>
             <a:fld id="{846CE7D5-CF57-46EF-B807-FDD0502418D4}" type="datetimeFigureOut">
               <a:rPr lang="en-GB" smtClean="0"/>
-              <a:t>20/08/2021</a:t>
+              <a:t>27/08/2021</a:t>
             </a:fld>
             <a:endParaRPr lang="en-GB"/>
           </a:p>
@@ -2107,7 +2107,7 @@
           <a:p>
             <a:fld id="{846CE7D5-CF57-46EF-B807-FDD0502418D4}" type="datetimeFigureOut">
               <a:rPr lang="en-GB" smtClean="0"/>
-              <a:t>20/08/2021</a:t>
+              <a:t>27/08/2021</a:t>
             </a:fld>
             <a:endParaRPr lang="en-GB"/>
           </a:p>
@@ -2364,7 +2364,7 @@
           <a:p>
             <a:fld id="{846CE7D5-CF57-46EF-B807-FDD0502418D4}" type="datetimeFigureOut">
               <a:rPr lang="en-GB" smtClean="0"/>
-              <a:t>20/08/2021</a:t>
+              <a:t>27/08/2021</a:t>
             </a:fld>
             <a:endParaRPr lang="en-GB"/>
           </a:p>
@@ -2577,7 +2577,7 @@
           <a:p>
             <a:fld id="{846CE7D5-CF57-46EF-B807-FDD0502418D4}" type="datetimeFigureOut">
               <a:rPr lang="en-GB" smtClean="0"/>
-              <a:t>20/08/2021</a:t>
+              <a:t>27/08/2021</a:t>
             </a:fld>
             <a:endParaRPr lang="en-GB"/>
           </a:p>
@@ -3232,8 +3232,8 @@
         </p:nvSpPr>
         <p:spPr>
           <a:xfrm>
-            <a:off x="3401730" y="5171030"/>
-            <a:ext cx="2327752" cy="1597068"/>
+            <a:off x="3401730" y="5158709"/>
+            <a:ext cx="2327752" cy="1500180"/>
           </a:xfrm>
           <a:prstGeom prst="round2DiagRect">
             <a:avLst/>
@@ -3268,8 +3268,17 @@
           <a:lstStyle/>
           <a:p>
             <a:pPr algn="ctr"/>
-            <a:r>
-              <a:rPr lang="en-GB">
+            <a:endParaRPr lang="en-GB" dirty="0">
+              <a:solidFill>
+                <a:schemeClr val="tx1"/>
+              </a:solidFill>
+              <a:cs typeface="Calibri"/>
+            </a:endParaRPr>
+          </a:p>
+          <a:p>
+            <a:pPr algn="ctr"/>
+            <a:r>
+              <a:rPr lang="en-GB" dirty="0">
                 <a:solidFill>
                   <a:schemeClr val="tx1"/>
                 </a:solidFill>
@@ -3277,7 +3286,46 @@
               </a:rPr>
               <a:t>Boiling Unit</a:t>
             </a:r>
-            <a:endParaRPr lang="en-US">
+          </a:p>
+          <a:p>
+            <a:pPr algn="ctr"/>
+            <a:endParaRPr lang="en-GB" dirty="0">
+              <a:solidFill>
+                <a:schemeClr val="tx1"/>
+              </a:solidFill>
+              <a:cs typeface="Calibri"/>
+            </a:endParaRPr>
+          </a:p>
+          <a:p>
+            <a:pPr algn="ctr"/>
+            <a:endParaRPr lang="en-GB" dirty="0">
+              <a:solidFill>
+                <a:schemeClr val="tx1"/>
+              </a:solidFill>
+              <a:cs typeface="Calibri"/>
+            </a:endParaRPr>
+          </a:p>
+          <a:p>
+            <a:pPr algn="ctr"/>
+            <a:endParaRPr lang="en-GB" dirty="0">
+              <a:solidFill>
+                <a:schemeClr val="tx1"/>
+              </a:solidFill>
+              <a:cs typeface="Calibri"/>
+            </a:endParaRPr>
+          </a:p>
+          <a:p>
+            <a:pPr algn="ctr"/>
+            <a:endParaRPr lang="en-GB" dirty="0">
+              <a:solidFill>
+                <a:schemeClr val="tx1"/>
+              </a:solidFill>
+              <a:cs typeface="Calibri"/>
+            </a:endParaRPr>
+          </a:p>
+          <a:p>
+            <a:pPr algn="ctr"/>
+            <a:endParaRPr lang="en-US" dirty="0">
               <a:solidFill>
                 <a:schemeClr val="tx1"/>
               </a:solidFill>
@@ -3410,7 +3458,7 @@
         <p:spPr>
           <a:xfrm>
             <a:off x="2013429" y="3031166"/>
-            <a:ext cx="3204573" cy="1920657"/>
+            <a:ext cx="3204573" cy="1582311"/>
           </a:xfrm>
           <a:prstGeom prst="round2DiagRect">
             <a:avLst/>
@@ -3446,7 +3494,7 @@
           <a:p>
             <a:pPr algn="ctr"/>
             <a:r>
-              <a:rPr lang="en-GB">
+              <a:rPr lang="en-GB" dirty="0">
                 <a:solidFill>
                   <a:schemeClr val="tx1"/>
                 </a:solidFill>
@@ -3515,7 +3563,7 @@
         </p:blipFill>
         <p:spPr>
           <a:xfrm>
-            <a:off x="2400104" y="3639268"/>
+            <a:off x="2345321" y="3490564"/>
             <a:ext cx="1160093" cy="1019958"/>
           </a:xfrm>
           <a:prstGeom prst="rect">
@@ -3537,16 +3585,15 @@
           </p:cNvPicPr>
           <p:nvPr/>
         </p:nvPicPr>
-        <p:blipFill>
+        <p:blipFill rotWithShape="1">
           <a:blip r:embed="rId9"/>
-          <a:stretch>
-            <a:fillRect/>
-          </a:stretch>
+          <a:srcRect t="14730" b="12484"/>
+          <a:stretch/>
         </p:blipFill>
         <p:spPr>
           <a:xfrm>
-            <a:off x="3953202" y="3566525"/>
-            <a:ext cx="1143653" cy="1165443"/>
+            <a:off x="3740986" y="3576398"/>
+            <a:ext cx="1143653" cy="848291"/>
           </a:xfrm>
           <a:prstGeom prst="rect">
             <a:avLst/>
@@ -4271,7 +4318,7 @@
         </p:nvSpPr>
         <p:spPr>
           <a:xfrm rot="10800000">
-            <a:off x="5507052" y="4444365"/>
+            <a:off x="5357287" y="4428025"/>
             <a:ext cx="845506" cy="730684"/>
           </a:xfrm>
           <a:prstGeom prst="bentUpArrow">
@@ -4680,6 +4727,42 @@
           </a:p>
         </p:txBody>
       </p:sp>
+      <p:pic>
+        <p:nvPicPr>
+          <p:cNvPr id="5" name="Picture 4">
+            <a:extLst>
+              <a:ext uri="{FF2B5EF4-FFF2-40B4-BE49-F238E27FC236}">
+                <a16:creationId xmlns:a16="http://schemas.microsoft.com/office/drawing/2014/main" id="{A6577404-2ED5-430C-B4FC-1373E86F3113}"/>
+              </a:ext>
+            </a:extLst>
+          </p:cNvPr>
+          <p:cNvPicPr>
+            <a:picLocks noChangeAspect="1"/>
+          </p:cNvPicPr>
+          <p:nvPr/>
+        </p:nvPicPr>
+        <p:blipFill>
+          <a:blip r:embed="rId12">
+            <a:extLst>
+              <a:ext uri="{28A0092B-C50C-407E-A947-70E740481C1C}">
+                <a14:useLocalDpi xmlns:a14="http://schemas.microsoft.com/office/drawing/2010/main" val="0"/>
+              </a:ext>
+            </a:extLst>
+          </a:blip>
+          <a:stretch>
+            <a:fillRect/>
+          </a:stretch>
+        </p:blipFill>
+        <p:spPr>
+          <a:xfrm rot="17139722">
+            <a:off x="4249045" y="5057075"/>
+            <a:ext cx="546899" cy="1891627"/>
+          </a:xfrm>
+          <a:prstGeom prst="rect">
+            <a:avLst/>
+          </a:prstGeom>
+        </p:spPr>
+      </p:pic>
     </p:spTree>
     <p:extLst>
       <p:ext uri="{BB962C8B-B14F-4D97-AF65-F5344CB8AC3E}">

</xml_diff>